<commit_message>
converted poster to .key
</commit_message>
<xml_diff>
--- a/poster.pptx
+++ b/poster.pptx
@@ -3884,7 +3884,7 @@
           <p:nvPr>
             <p:extLst>
               <p:ext uri="{D42A27DB-BD31-4B8C-83A1-F6EECF244321}">
-                <p14:modId xmlns:p14="http://schemas.microsoft.com/office/powerpoint/2010/main" val="53165534"/>
+                <p14:modId xmlns:p14="http://schemas.microsoft.com/office/powerpoint/2010/main" val="1652616794"/>
               </p:ext>
             </p:extLst>
           </p:nvPr>
@@ -3910,14 +3910,49 @@
                     <a:bodyPr/>
                     <a:lstStyle/>
                     <a:p>
+                      <a:pPr algn="ctr"/>
                       <a:r>
                         <a:rPr lang="en-US" dirty="0" smtClean="0">
                           <a:solidFill>
                             <a:schemeClr val="tx1"/>
                           </a:solidFill>
                         </a:rPr>
-                        <a:t>STUFF</a:t>
+                        <a:t>Question:</a:t>
                       </a:r>
+                    </a:p>
+                    <a:p>
+                      <a:pPr marL="457200" marR="0" indent="-457200" algn="l" defTabSz="2743200" rtl="0" eaLnBrk="1" fontAlgn="auto" latinLnBrk="0" hangingPunct="1">
+                        <a:lnSpc>
+                          <a:spcPct val="100000"/>
+                        </a:lnSpc>
+                        <a:spcBef>
+                          <a:spcPts val="0"/>
+                        </a:spcBef>
+                        <a:spcAft>
+                          <a:spcPts val="0"/>
+                        </a:spcAft>
+                        <a:buClrTx/>
+                        <a:buSzTx/>
+                        <a:buFont typeface="Arial" charset="0"/>
+                        <a:buChar char="•"/>
+                        <a:tabLst/>
+                        <a:defRPr/>
+                      </a:pPr>
+                      <a:r>
+                        <a:rPr lang="en-US" sz="3000" b="1" kern="1200" dirty="0" smtClean="0">
+                          <a:solidFill>
+                            <a:schemeClr val="tx1"/>
+                          </a:solidFill>
+                          <a:effectLst/>
+                          <a:latin typeface="+mn-lt"/>
+                          <a:ea typeface="+mn-ea"/>
+                          <a:cs typeface="+mn-cs"/>
+                        </a:rPr>
+                        <a:t>if, given different "types" of city establishments/infrastructure that can either be categorized as indicators of "stronger community" or "weaker community", can we find other correlations with other indicators of inequality or "instability" in Boston and address common problems in terms of this social aspect?</a:t>
+                      </a:r>
+                    </a:p>
+                    <a:p>
+                      <a:pPr algn="ctr"/>
                       <a:endParaRPr lang="en-US" dirty="0">
                         <a:solidFill>
                           <a:schemeClr val="tx1"/>

</xml_diff>